<commit_message>
Trying to finish out slideMaster generation
When testing everything appears to be working. I think the library is
having a hard time parsing out `r:id` as an attribute. If I diff the
output with the actual everything appears to be fine.

Amos King @adkron <amos@binarynoggin.com>
</commit_message>
<xml_diff>
--- a/spec/fixtures/empty_slide.pptx
+++ b/spec/fixtures/empty_slide.pptx
@@ -35,13 +35,12 @@
         <p:cNvGrpSpPr/>
         <p:nvPr/>
       </p:nvGrpSpPr>
-      <p:grpSpPr>
-      </p:grpSpPr>
+      <p:grpSpPr/>
     </p:spTree>
   </p:cSld>
   <p:clrMap bg1="lt1" tx1="dk1" bg2="lt2" tx2="dk2" accent1="accent1" accent2="accent2" accent3="accent3" accent4="accent4" accent5="accent5" accent6="accent6" hlink="hlink" folHlink="folHlink"/>
   <p:sldLayoutIdLst>
-    <p:sldLayoutId id="2147483655" r:id="rId7"/>
+    <p:sldLayoutId r:id="rId7"/>
   </p:sldLayoutIdLst>
 </p:sldMaster>
 </file>

</xml_diff>

<commit_message>
Start adding slides to presentation
Amos King @adkron <amos@binarynoggin.com>
</commit_message>
<xml_diff>
--- a/spec/fixtures/empty_slide.pptx
+++ b/spec/fixtures/empty_slide.pptx
@@ -1,12 +1,13 @@
 
 <file path=ppt/presentation.xml><?xml version="1.0" encoding="utf-8"?>
-<p:presentation xmlns:a="http://schemas.openxmlformats.org/drawingml/2006/main" xmlns:r="http://schemas.openxmlformats.org/officeDocument/2006/relationships" xmlns:p="http://schemas.openxmlformats.org/presentationml/2006/main" saveSubsetFonts="1" autoCompressPictures="0">
+<p:presentation xmlns:a="http://schemas.openxmlformats.org/drawingml/2006/main" xmlns:r="http://schemas.openxmlformats.org/officeDocument/2006/relationships" xmlns:p="http://schemas.openxmlformats.org/presentationml/2006/main">
   <p:sldMasterIdLst>
-    <p:sldMasterId id="2147483648" r:id="rId1"/>
+    <p:sldMasterId r:id="rId1"/>
   </p:sldMasterIdLst>
   <p:sldIdLst>
     <p:sldId id="256" r:id="rId2"/>
   </p:sldIdLst>
+  <p:sldSz cx="12192000" cy="6858000"/>
   <p:notesSz cx="6858000" cy="9144000"/>
 </p:presentation>
 </file>

</xml_diff>